<commit_message>
mulai mengimplementasikan rules ke chat
</commit_message>
<xml_diff>
--- a/files/Rules.pptx
+++ b/files/Rules.pptx
@@ -250,7 +250,7 @@
           <a:p>
             <a:fld id="{F5EE77D2-A7A0-440A-9FFE-8D75038282A9}" type="datetimeFigureOut">
               <a:rPr lang="en-GB" smtClean="0"/>
-              <a:t>12/12/2020</a:t>
+              <a:t>14/12/2020</a:t>
             </a:fld>
             <a:endParaRPr lang="en-GB"/>
           </a:p>
@@ -420,7 +420,7 @@
           <a:p>
             <a:fld id="{F5EE77D2-A7A0-440A-9FFE-8D75038282A9}" type="datetimeFigureOut">
               <a:rPr lang="en-GB" smtClean="0"/>
-              <a:t>12/12/2020</a:t>
+              <a:t>14/12/2020</a:t>
             </a:fld>
             <a:endParaRPr lang="en-GB"/>
           </a:p>
@@ -600,7 +600,7 @@
           <a:p>
             <a:fld id="{F5EE77D2-A7A0-440A-9FFE-8D75038282A9}" type="datetimeFigureOut">
               <a:rPr lang="en-GB" smtClean="0"/>
-              <a:t>12/12/2020</a:t>
+              <a:t>14/12/2020</a:t>
             </a:fld>
             <a:endParaRPr lang="en-GB"/>
           </a:p>
@@ -711,7 +711,7 @@
           <a:noFill/>
           <a:extLst>
             <a:ext uri="{909E8E84-426E-40dd-AFC4-6F175D3DCCD1}">
-              <a14:hiddenFill xmlns="" xmlns:a14="http://schemas.microsoft.com/office/drawing/2010/main">
+              <a14:hiddenFill xmlns:a14="http://schemas.microsoft.com/office/drawing/2010/main" xmlns="">
                 <a:solidFill>
                   <a:srgbClr val="FFFFFF"/>
                 </a:solidFill>
@@ -771,7 +771,7 @@
             </a:ln>
             <a:extLst>
               <a:ext uri="{91240B29-F687-4f45-9708-019B960494DF}">
-                <a14:hiddenLine xmlns="" xmlns:a14="http://schemas.microsoft.com/office/drawing/2010/main" w="9525">
+                <a14:hiddenLine xmlns:a14="http://schemas.microsoft.com/office/drawing/2010/main" xmlns="" w="9525">
                   <a:solidFill>
                     <a:srgbClr val="000000"/>
                   </a:solidFill>
@@ -861,7 +861,7 @@
             </a:ln>
             <a:extLst>
               <a:ext uri="{91240B29-F687-4f45-9708-019B960494DF}">
-                <a14:hiddenLine xmlns="" xmlns:a14="http://schemas.microsoft.com/office/drawing/2010/main" w="9525">
+                <a14:hiddenLine xmlns:a14="http://schemas.microsoft.com/office/drawing/2010/main" xmlns="" w="9525">
                   <a:solidFill>
                     <a:srgbClr val="000000"/>
                   </a:solidFill>
@@ -951,7 +951,7 @@
             </a:ln>
             <a:extLst>
               <a:ext uri="{91240B29-F687-4f45-9708-019B960494DF}">
-                <a14:hiddenLine xmlns="" xmlns:a14="http://schemas.microsoft.com/office/drawing/2010/main" w="9525">
+                <a14:hiddenLine xmlns:a14="http://schemas.microsoft.com/office/drawing/2010/main" xmlns="" w="9525">
                   <a:solidFill>
                     <a:srgbClr val="000000"/>
                   </a:solidFill>
@@ -985,7 +985,7 @@
             </a:ln>
             <a:extLst>
               <a:ext uri="{91240B29-F687-4f45-9708-019B960494DF}">
-                <a14:hiddenLine xmlns="" xmlns:a14="http://schemas.microsoft.com/office/drawing/2010/main" w="9525">
+                <a14:hiddenLine xmlns:a14="http://schemas.microsoft.com/office/drawing/2010/main" xmlns="" w="9525">
                   <a:solidFill>
                     <a:srgbClr val="000000"/>
                   </a:solidFill>
@@ -1075,7 +1075,7 @@
             </a:ln>
             <a:extLst>
               <a:ext uri="{91240B29-F687-4f45-9708-019B960494DF}">
-                <a14:hiddenLine xmlns="" xmlns:a14="http://schemas.microsoft.com/office/drawing/2010/main" w="9525">
+                <a14:hiddenLine xmlns:a14="http://schemas.microsoft.com/office/drawing/2010/main" xmlns="" w="9525">
                   <a:solidFill>
                     <a:srgbClr val="000000"/>
                   </a:solidFill>
@@ -1137,7 +1137,7 @@
             </a:ln>
             <a:extLst>
               <a:ext uri="{91240B29-F687-4f45-9708-019B960494DF}">
-                <a14:hiddenLine xmlns="" xmlns:a14="http://schemas.microsoft.com/office/drawing/2010/main" w="9525">
+                <a14:hiddenLine xmlns:a14="http://schemas.microsoft.com/office/drawing/2010/main" xmlns="" w="9525">
                   <a:solidFill>
                     <a:srgbClr val="000000"/>
                   </a:solidFill>
@@ -1199,7 +1199,7 @@
             </a:ln>
             <a:extLst>
               <a:ext uri="{91240B29-F687-4f45-9708-019B960494DF}">
-                <a14:hiddenLine xmlns="" xmlns:a14="http://schemas.microsoft.com/office/drawing/2010/main" w="9525">
+                <a14:hiddenLine xmlns:a14="http://schemas.microsoft.com/office/drawing/2010/main" xmlns="" w="9525">
                   <a:solidFill>
                     <a:srgbClr val="000000"/>
                   </a:solidFill>
@@ -1289,7 +1289,7 @@
             </a:ln>
             <a:extLst>
               <a:ext uri="{91240B29-F687-4f45-9708-019B960494DF}">
-                <a14:hiddenLine xmlns="" xmlns:a14="http://schemas.microsoft.com/office/drawing/2010/main" w="9525">
+                <a14:hiddenLine xmlns:a14="http://schemas.microsoft.com/office/drawing/2010/main" xmlns="" w="9525">
                   <a:solidFill>
                     <a:srgbClr val="000000"/>
                   </a:solidFill>
@@ -1351,7 +1351,7 @@
             </a:ln>
             <a:extLst>
               <a:ext uri="{91240B29-F687-4f45-9708-019B960494DF}">
-                <a14:hiddenLine xmlns="" xmlns:a14="http://schemas.microsoft.com/office/drawing/2010/main" w="9525">
+                <a14:hiddenLine xmlns:a14="http://schemas.microsoft.com/office/drawing/2010/main" xmlns="" w="9525">
                   <a:solidFill>
                     <a:srgbClr val="000000"/>
                   </a:solidFill>
@@ -1413,7 +1413,7 @@
             </a:ln>
             <a:extLst>
               <a:ext uri="{91240B29-F687-4f45-9708-019B960494DF}">
-                <a14:hiddenLine xmlns="" xmlns:a14="http://schemas.microsoft.com/office/drawing/2010/main" w="9525">
+                <a14:hiddenLine xmlns:a14="http://schemas.microsoft.com/office/drawing/2010/main" xmlns="" w="9525">
                   <a:solidFill>
                     <a:srgbClr val="000000"/>
                   </a:solidFill>
@@ -1503,7 +1503,7 @@
             </a:ln>
             <a:extLst>
               <a:ext uri="{91240B29-F687-4f45-9708-019B960494DF}">
-                <a14:hiddenLine xmlns="" xmlns:a14="http://schemas.microsoft.com/office/drawing/2010/main" w="9525">
+                <a14:hiddenLine xmlns:a14="http://schemas.microsoft.com/office/drawing/2010/main" xmlns="" w="9525">
                   <a:solidFill>
                     <a:srgbClr val="000000"/>
                   </a:solidFill>
@@ -1593,7 +1593,7 @@
             </a:ln>
             <a:extLst>
               <a:ext uri="{91240B29-F687-4f45-9708-019B960494DF}">
-                <a14:hiddenLine xmlns="" xmlns:a14="http://schemas.microsoft.com/office/drawing/2010/main" w="9525">
+                <a14:hiddenLine xmlns:a14="http://schemas.microsoft.com/office/drawing/2010/main" xmlns="" w="9525">
                   <a:solidFill>
                     <a:srgbClr val="000000"/>
                   </a:solidFill>
@@ -1655,7 +1655,7 @@
             </a:ln>
             <a:extLst>
               <a:ext uri="{91240B29-F687-4f45-9708-019B960494DF}">
-                <a14:hiddenLine xmlns="" xmlns:a14="http://schemas.microsoft.com/office/drawing/2010/main" w="9525">
+                <a14:hiddenLine xmlns:a14="http://schemas.microsoft.com/office/drawing/2010/main" xmlns="" w="9525">
                   <a:solidFill>
                     <a:srgbClr val="000000"/>
                   </a:solidFill>
@@ -1765,7 +1765,7 @@
             </a:ln>
             <a:extLst>
               <a:ext uri="{91240B29-F687-4f45-9708-019B960494DF}">
-                <a14:hiddenLine xmlns="" xmlns:a14="http://schemas.microsoft.com/office/drawing/2010/main" w="9525">
+                <a14:hiddenLine xmlns:a14="http://schemas.microsoft.com/office/drawing/2010/main" xmlns="" w="9525">
                   <a:solidFill>
                     <a:srgbClr val="000000"/>
                   </a:solidFill>
@@ -1827,7 +1827,7 @@
             </a:ln>
             <a:extLst>
               <a:ext uri="{91240B29-F687-4f45-9708-019B960494DF}">
-                <a14:hiddenLine xmlns="" xmlns:a14="http://schemas.microsoft.com/office/drawing/2010/main" w="9525">
+                <a14:hiddenLine xmlns:a14="http://schemas.microsoft.com/office/drawing/2010/main" xmlns="" w="9525">
                   <a:solidFill>
                     <a:srgbClr val="000000"/>
                   </a:solidFill>
@@ -1917,7 +1917,7 @@
             </a:ln>
             <a:extLst>
               <a:ext uri="{91240B29-F687-4f45-9708-019B960494DF}">
-                <a14:hiddenLine xmlns="" xmlns:a14="http://schemas.microsoft.com/office/drawing/2010/main" w="9525">
+                <a14:hiddenLine xmlns:a14="http://schemas.microsoft.com/office/drawing/2010/main" xmlns="" w="9525">
                   <a:solidFill>
                     <a:srgbClr val="000000"/>
                   </a:solidFill>
@@ -2007,7 +2007,7 @@
             </a:ln>
             <a:extLst>
               <a:ext uri="{91240B29-F687-4f45-9708-019B960494DF}">
-                <a14:hiddenLine xmlns="" xmlns:a14="http://schemas.microsoft.com/office/drawing/2010/main" w="9525">
+                <a14:hiddenLine xmlns:a14="http://schemas.microsoft.com/office/drawing/2010/main" xmlns="" w="9525">
                   <a:solidFill>
                     <a:srgbClr val="000000"/>
                   </a:solidFill>
@@ -2069,7 +2069,7 @@
             </a:ln>
             <a:extLst>
               <a:ext uri="{91240B29-F687-4f45-9708-019B960494DF}">
-                <a14:hiddenLine xmlns="" xmlns:a14="http://schemas.microsoft.com/office/drawing/2010/main" w="9525">
+                <a14:hiddenLine xmlns:a14="http://schemas.microsoft.com/office/drawing/2010/main" xmlns="" w="9525">
                   <a:solidFill>
                     <a:srgbClr val="000000"/>
                   </a:solidFill>
@@ -2159,7 +2159,7 @@
             </a:ln>
             <a:extLst>
               <a:ext uri="{91240B29-F687-4f45-9708-019B960494DF}">
-                <a14:hiddenLine xmlns="" xmlns:a14="http://schemas.microsoft.com/office/drawing/2010/main" w="9525">
+                <a14:hiddenLine xmlns:a14="http://schemas.microsoft.com/office/drawing/2010/main" xmlns="" w="9525">
                   <a:solidFill>
                     <a:srgbClr val="000000"/>
                   </a:solidFill>
@@ -2249,7 +2249,7 @@
             </a:ln>
             <a:extLst>
               <a:ext uri="{91240B29-F687-4f45-9708-019B960494DF}">
-                <a14:hiddenLine xmlns="" xmlns:a14="http://schemas.microsoft.com/office/drawing/2010/main" w="9525">
+                <a14:hiddenLine xmlns:a14="http://schemas.microsoft.com/office/drawing/2010/main" xmlns="" w="9525">
                   <a:solidFill>
                     <a:srgbClr val="000000"/>
                   </a:solidFill>
@@ -2305,7 +2305,7 @@
             </a:ln>
             <a:extLst>
               <a:ext uri="{91240B29-F687-4f45-9708-019B960494DF}">
-                <a14:hiddenLine xmlns="" xmlns:a14="http://schemas.microsoft.com/office/drawing/2010/main" w="9525">
+                <a14:hiddenLine xmlns:a14="http://schemas.microsoft.com/office/drawing/2010/main" xmlns="" w="9525">
                   <a:solidFill>
                     <a:srgbClr val="000000"/>
                   </a:solidFill>
@@ -2395,7 +2395,7 @@
             </a:ln>
             <a:extLst>
               <a:ext uri="{91240B29-F687-4f45-9708-019B960494DF}">
-                <a14:hiddenLine xmlns="" xmlns:a14="http://schemas.microsoft.com/office/drawing/2010/main" w="9525">
+                <a14:hiddenLine xmlns:a14="http://schemas.microsoft.com/office/drawing/2010/main" xmlns="" w="9525">
                   <a:solidFill>
                     <a:srgbClr val="000000"/>
                   </a:solidFill>
@@ -2451,7 +2451,7 @@
             </a:ln>
             <a:extLst>
               <a:ext uri="{91240B29-F687-4f45-9708-019B960494DF}">
-                <a14:hiddenLine xmlns="" xmlns:a14="http://schemas.microsoft.com/office/drawing/2010/main" w="9525">
+                <a14:hiddenLine xmlns:a14="http://schemas.microsoft.com/office/drawing/2010/main" xmlns="" w="9525">
                   <a:solidFill>
                     <a:srgbClr val="000000"/>
                   </a:solidFill>
@@ -2541,7 +2541,7 @@
             </a:ln>
             <a:extLst>
               <a:ext uri="{91240B29-F687-4f45-9708-019B960494DF}">
-                <a14:hiddenLine xmlns="" xmlns:a14="http://schemas.microsoft.com/office/drawing/2010/main" w="9525">
+                <a14:hiddenLine xmlns:a14="http://schemas.microsoft.com/office/drawing/2010/main" xmlns="" w="9525">
                   <a:solidFill>
                     <a:srgbClr val="000000"/>
                   </a:solidFill>
@@ -2609,7 +2609,7 @@
             </a:ln>
             <a:extLst>
               <a:ext uri="{91240B29-F687-4f45-9708-019B960494DF}">
-                <a14:hiddenLine xmlns="" xmlns:a14="http://schemas.microsoft.com/office/drawing/2010/main" w="9525">
+                <a14:hiddenLine xmlns:a14="http://schemas.microsoft.com/office/drawing/2010/main" xmlns="" w="9525">
                   <a:solidFill>
                     <a:srgbClr val="000000"/>
                   </a:solidFill>
@@ -2699,7 +2699,7 @@
             </a:ln>
             <a:extLst>
               <a:ext uri="{91240B29-F687-4f45-9708-019B960494DF}">
-                <a14:hiddenLine xmlns="" xmlns:a14="http://schemas.microsoft.com/office/drawing/2010/main" w="9525">
+                <a14:hiddenLine xmlns:a14="http://schemas.microsoft.com/office/drawing/2010/main" xmlns="" w="9525">
                   <a:solidFill>
                     <a:srgbClr val="000000"/>
                   </a:solidFill>
@@ -2767,7 +2767,7 @@
             </a:ln>
             <a:extLst>
               <a:ext uri="{91240B29-F687-4f45-9708-019B960494DF}">
-                <a14:hiddenLine xmlns="" xmlns:a14="http://schemas.microsoft.com/office/drawing/2010/main" w="9525">
+                <a14:hiddenLine xmlns:a14="http://schemas.microsoft.com/office/drawing/2010/main" xmlns="" w="9525">
                   <a:solidFill>
                     <a:srgbClr val="000000"/>
                   </a:solidFill>
@@ -2857,7 +2857,7 @@
             </a:ln>
             <a:extLst>
               <a:ext uri="{91240B29-F687-4f45-9708-019B960494DF}">
-                <a14:hiddenLine xmlns="" xmlns:a14="http://schemas.microsoft.com/office/drawing/2010/main" w="9525">
+                <a14:hiddenLine xmlns:a14="http://schemas.microsoft.com/office/drawing/2010/main" xmlns="" w="9525">
                   <a:solidFill>
                     <a:srgbClr val="000000"/>
                   </a:solidFill>
@@ -2891,7 +2891,7 @@
             </a:ln>
             <a:extLst>
               <a:ext uri="{91240B29-F687-4f45-9708-019B960494DF}">
-                <a14:hiddenLine xmlns="" xmlns:a14="http://schemas.microsoft.com/office/drawing/2010/main" w="9525">
+                <a14:hiddenLine xmlns:a14="http://schemas.microsoft.com/office/drawing/2010/main" xmlns="" w="9525">
                   <a:solidFill>
                     <a:srgbClr val="000000"/>
                   </a:solidFill>
@@ -2981,7 +2981,7 @@
             </a:ln>
             <a:extLst>
               <a:ext uri="{91240B29-F687-4f45-9708-019B960494DF}">
-                <a14:hiddenLine xmlns="" xmlns:a14="http://schemas.microsoft.com/office/drawing/2010/main" w="9525">
+                <a14:hiddenLine xmlns:a14="http://schemas.microsoft.com/office/drawing/2010/main" xmlns="" w="9525">
                   <a:solidFill>
                     <a:srgbClr val="000000"/>
                   </a:solidFill>
@@ -3043,7 +3043,7 @@
             </a:ln>
             <a:extLst>
               <a:ext uri="{91240B29-F687-4f45-9708-019B960494DF}">
-                <a14:hiddenLine xmlns="" xmlns:a14="http://schemas.microsoft.com/office/drawing/2010/main" w="9525">
+                <a14:hiddenLine xmlns:a14="http://schemas.microsoft.com/office/drawing/2010/main" xmlns="" w="9525">
                   <a:solidFill>
                     <a:srgbClr val="000000"/>
                   </a:solidFill>
@@ -3105,7 +3105,7 @@
             </a:ln>
             <a:extLst>
               <a:ext uri="{91240B29-F687-4f45-9708-019B960494DF}">
-                <a14:hiddenLine xmlns="" xmlns:a14="http://schemas.microsoft.com/office/drawing/2010/main" w="9525">
+                <a14:hiddenLine xmlns:a14="http://schemas.microsoft.com/office/drawing/2010/main" xmlns="" w="9525">
                   <a:solidFill>
                     <a:srgbClr val="000000"/>
                   </a:solidFill>
@@ -3195,7 +3195,7 @@
             </a:ln>
             <a:extLst>
               <a:ext uri="{91240B29-F687-4f45-9708-019B960494DF}">
-                <a14:hiddenLine xmlns="" xmlns:a14="http://schemas.microsoft.com/office/drawing/2010/main" w="9525">
+                <a14:hiddenLine xmlns:a14="http://schemas.microsoft.com/office/drawing/2010/main" xmlns="" w="9525">
                   <a:solidFill>
                     <a:srgbClr val="000000"/>
                   </a:solidFill>
@@ -3263,7 +3263,7 @@
             </a:ln>
             <a:extLst>
               <a:ext uri="{91240B29-F687-4f45-9708-019B960494DF}">
-                <a14:hiddenLine xmlns="" xmlns:a14="http://schemas.microsoft.com/office/drawing/2010/main" w="9525">
+                <a14:hiddenLine xmlns:a14="http://schemas.microsoft.com/office/drawing/2010/main" xmlns="" w="9525">
                   <a:solidFill>
                     <a:srgbClr val="000000"/>
                   </a:solidFill>
@@ -3325,7 +3325,7 @@
             </a:ln>
             <a:extLst>
               <a:ext uri="{91240B29-F687-4f45-9708-019B960494DF}">
-                <a14:hiddenLine xmlns="" xmlns:a14="http://schemas.microsoft.com/office/drawing/2010/main" w="9525">
+                <a14:hiddenLine xmlns:a14="http://schemas.microsoft.com/office/drawing/2010/main" xmlns="" w="9525">
                   <a:solidFill>
                     <a:srgbClr val="000000"/>
                   </a:solidFill>
@@ -3415,7 +3415,7 @@
             </a:ln>
             <a:extLst>
               <a:ext uri="{91240B29-F687-4f45-9708-019B960494DF}">
-                <a14:hiddenLine xmlns="" xmlns:a14="http://schemas.microsoft.com/office/drawing/2010/main" w="9525">
+                <a14:hiddenLine xmlns:a14="http://schemas.microsoft.com/office/drawing/2010/main" xmlns="" w="9525">
                   <a:solidFill>
                     <a:srgbClr val="000000"/>
                   </a:solidFill>
@@ -3477,7 +3477,7 @@
             </a:ln>
             <a:extLst>
               <a:ext uri="{91240B29-F687-4f45-9708-019B960494DF}">
-                <a14:hiddenLine xmlns="" xmlns:a14="http://schemas.microsoft.com/office/drawing/2010/main" w="9525">
+                <a14:hiddenLine xmlns:a14="http://schemas.microsoft.com/office/drawing/2010/main" xmlns="" w="9525">
                   <a:solidFill>
                     <a:srgbClr val="000000"/>
                   </a:solidFill>
@@ -3567,7 +3567,7 @@
             </a:ln>
             <a:extLst>
               <a:ext uri="{91240B29-F687-4f45-9708-019B960494DF}">
-                <a14:hiddenLine xmlns="" xmlns:a14="http://schemas.microsoft.com/office/drawing/2010/main" w="9525">
+                <a14:hiddenLine xmlns:a14="http://schemas.microsoft.com/office/drawing/2010/main" xmlns="" w="9525">
                   <a:solidFill>
                     <a:srgbClr val="000000"/>
                   </a:solidFill>
@@ -3629,7 +3629,7 @@
             </a:ln>
             <a:extLst>
               <a:ext uri="{91240B29-F687-4f45-9708-019B960494DF}">
-                <a14:hiddenLine xmlns="" xmlns:a14="http://schemas.microsoft.com/office/drawing/2010/main" w="9525">
+                <a14:hiddenLine xmlns:a14="http://schemas.microsoft.com/office/drawing/2010/main" xmlns="" w="9525">
                   <a:solidFill>
                     <a:srgbClr val="000000"/>
                   </a:solidFill>
@@ -3719,7 +3719,7 @@
             </a:ln>
             <a:extLst>
               <a:ext uri="{91240B29-F687-4f45-9708-019B960494DF}">
-                <a14:hiddenLine xmlns="" xmlns:a14="http://schemas.microsoft.com/office/drawing/2010/main" w="9525">
+                <a14:hiddenLine xmlns:a14="http://schemas.microsoft.com/office/drawing/2010/main" xmlns="" w="9525">
                   <a:solidFill>
                     <a:srgbClr val="000000"/>
                   </a:solidFill>
@@ -3753,7 +3753,7 @@
             </a:ln>
             <a:extLst>
               <a:ext uri="{91240B29-F687-4f45-9708-019B960494DF}">
-                <a14:hiddenLine xmlns="" xmlns:a14="http://schemas.microsoft.com/office/drawing/2010/main" w="9525">
+                <a14:hiddenLine xmlns:a14="http://schemas.microsoft.com/office/drawing/2010/main" xmlns="" w="9525">
                   <a:solidFill>
                     <a:srgbClr val="000000"/>
                   </a:solidFill>
@@ -3818,7 +3818,7 @@
             </a:ln>
             <a:extLst>
               <a:ext uri="{91240B29-F687-4f45-9708-019B960494DF}">
-                <a14:hiddenLine xmlns="" xmlns:a14="http://schemas.microsoft.com/office/drawing/2010/main" w="9525">
+                <a14:hiddenLine xmlns:a14="http://schemas.microsoft.com/office/drawing/2010/main" xmlns="" w="9525">
                   <a:solidFill>
                     <a:srgbClr val="000000"/>
                   </a:solidFill>
@@ -3908,7 +3908,7 @@
             </a:ln>
             <a:extLst>
               <a:ext uri="{91240B29-F687-4f45-9708-019B960494DF}">
-                <a14:hiddenLine xmlns="" xmlns:a14="http://schemas.microsoft.com/office/drawing/2010/main" w="9525">
+                <a14:hiddenLine xmlns:a14="http://schemas.microsoft.com/office/drawing/2010/main" xmlns="" w="9525">
                   <a:solidFill>
                     <a:srgbClr val="000000"/>
                   </a:solidFill>
@@ -3970,7 +3970,7 @@
             </a:ln>
             <a:extLst>
               <a:ext uri="{91240B29-F687-4f45-9708-019B960494DF}">
-                <a14:hiddenLine xmlns="" xmlns:a14="http://schemas.microsoft.com/office/drawing/2010/main" w="9525">
+                <a14:hiddenLine xmlns:a14="http://schemas.microsoft.com/office/drawing/2010/main" xmlns="" w="9525">
                   <a:solidFill>
                     <a:srgbClr val="000000"/>
                   </a:solidFill>
@@ -4060,7 +4060,7 @@
             </a:ln>
             <a:extLst>
               <a:ext uri="{91240B29-F687-4f45-9708-019B960494DF}">
-                <a14:hiddenLine xmlns="" xmlns:a14="http://schemas.microsoft.com/office/drawing/2010/main" w="9525">
+                <a14:hiddenLine xmlns:a14="http://schemas.microsoft.com/office/drawing/2010/main" xmlns="" w="9525">
                   <a:solidFill>
                     <a:srgbClr val="000000"/>
                   </a:solidFill>
@@ -4150,7 +4150,7 @@
             </a:ln>
             <a:extLst>
               <a:ext uri="{91240B29-F687-4f45-9708-019B960494DF}">
-                <a14:hiddenLine xmlns="" xmlns:a14="http://schemas.microsoft.com/office/drawing/2010/main" w="9525">
+                <a14:hiddenLine xmlns:a14="http://schemas.microsoft.com/office/drawing/2010/main" xmlns="" w="9525">
                   <a:solidFill>
                     <a:srgbClr val="000000"/>
                   </a:solidFill>
@@ -4215,7 +4215,7 @@
             </a:ln>
             <a:extLst>
               <a:ext uri="{91240B29-F687-4f45-9708-019B960494DF}">
-                <a14:hiddenLine xmlns="" xmlns:a14="http://schemas.microsoft.com/office/drawing/2010/main" w="9525">
+                <a14:hiddenLine xmlns:a14="http://schemas.microsoft.com/office/drawing/2010/main" xmlns="" w="9525">
                   <a:solidFill>
                     <a:srgbClr val="000000"/>
                   </a:solidFill>
@@ -4277,7 +4277,7 @@
             </a:ln>
             <a:extLst>
               <a:ext uri="{91240B29-F687-4f45-9708-019B960494DF}">
-                <a14:hiddenLine xmlns="" xmlns:a14="http://schemas.microsoft.com/office/drawing/2010/main" w="9525">
+                <a14:hiddenLine xmlns:a14="http://schemas.microsoft.com/office/drawing/2010/main" xmlns="" w="9525">
                   <a:solidFill>
                     <a:srgbClr val="000000"/>
                   </a:solidFill>
@@ -4367,7 +4367,7 @@
             </a:ln>
             <a:extLst>
               <a:ext uri="{91240B29-F687-4f45-9708-019B960494DF}">
-                <a14:hiddenLine xmlns="" xmlns:a14="http://schemas.microsoft.com/office/drawing/2010/main" w="9525">
+                <a14:hiddenLine xmlns:a14="http://schemas.microsoft.com/office/drawing/2010/main" xmlns="" w="9525">
                   <a:solidFill>
                     <a:srgbClr val="000000"/>
                   </a:solidFill>
@@ -4457,7 +4457,7 @@
             </a:ln>
             <a:extLst>
               <a:ext uri="{91240B29-F687-4f45-9708-019B960494DF}">
-                <a14:hiddenLine xmlns="" xmlns:a14="http://schemas.microsoft.com/office/drawing/2010/main" w="9525">
+                <a14:hiddenLine xmlns:a14="http://schemas.microsoft.com/office/drawing/2010/main" xmlns="" w="9525">
                   <a:solidFill>
                     <a:srgbClr val="000000"/>
                   </a:solidFill>
@@ -4519,7 +4519,7 @@
             </a:ln>
             <a:extLst>
               <a:ext uri="{91240B29-F687-4f45-9708-019B960494DF}">
-                <a14:hiddenLine xmlns="" xmlns:a14="http://schemas.microsoft.com/office/drawing/2010/main" w="9525">
+                <a14:hiddenLine xmlns:a14="http://schemas.microsoft.com/office/drawing/2010/main" xmlns="" w="9525">
                   <a:solidFill>
                     <a:srgbClr val="000000"/>
                   </a:solidFill>
@@ -4639,7 +4639,7 @@
             </a:ln>
             <a:extLst>
               <a:ext uri="{91240B29-F687-4f45-9708-019B960494DF}">
-                <a14:hiddenLine xmlns="" xmlns:a14="http://schemas.microsoft.com/office/drawing/2010/main" w="9525">
+                <a14:hiddenLine xmlns:a14="http://schemas.microsoft.com/office/drawing/2010/main" xmlns="" w="9525">
                   <a:solidFill>
                     <a:srgbClr val="000000"/>
                   </a:solidFill>
@@ -4707,7 +4707,7 @@
             </a:ln>
             <a:extLst>
               <a:ext uri="{91240B29-F687-4f45-9708-019B960494DF}">
-                <a14:hiddenLine xmlns="" xmlns:a14="http://schemas.microsoft.com/office/drawing/2010/main" w="9525">
+                <a14:hiddenLine xmlns:a14="http://schemas.microsoft.com/office/drawing/2010/main" xmlns="" w="9525">
                   <a:solidFill>
                     <a:srgbClr val="000000"/>
                   </a:solidFill>
@@ -4797,7 +4797,7 @@
             </a:ln>
             <a:extLst>
               <a:ext uri="{91240B29-F687-4f45-9708-019B960494DF}">
-                <a14:hiddenLine xmlns="" xmlns:a14="http://schemas.microsoft.com/office/drawing/2010/main" w="9525">
+                <a14:hiddenLine xmlns:a14="http://schemas.microsoft.com/office/drawing/2010/main" xmlns="" w="9525">
                   <a:solidFill>
                     <a:srgbClr val="000000"/>
                   </a:solidFill>
@@ -4937,7 +4937,7 @@
           <a:p>
             <a:fld id="{F5EE77D2-A7A0-440A-9FFE-8D75038282A9}" type="datetimeFigureOut">
               <a:rPr lang="en-GB" smtClean="0"/>
-              <a:t>12/12/2020</a:t>
+              <a:t>14/12/2020</a:t>
             </a:fld>
             <a:endParaRPr lang="en-GB"/>
           </a:p>
@@ -5117,7 +5117,7 @@
           <a:p>
             <a:fld id="{F5EE77D2-A7A0-440A-9FFE-8D75038282A9}" type="datetimeFigureOut">
               <a:rPr lang="en-GB" smtClean="0"/>
-              <a:t>12/12/2020</a:t>
+              <a:t>14/12/2020</a:t>
             </a:fld>
             <a:endParaRPr lang="en-GB"/>
           </a:p>
@@ -5367,7 +5367,7 @@
           <a:p>
             <a:fld id="{F5EE77D2-A7A0-440A-9FFE-8D75038282A9}" type="datetimeFigureOut">
               <a:rPr lang="en-GB" smtClean="0"/>
-              <a:t>12/12/2020</a:t>
+              <a:t>14/12/2020</a:t>
             </a:fld>
             <a:endParaRPr lang="en-GB"/>
           </a:p>
@@ -5599,7 +5599,7 @@
           <a:p>
             <a:fld id="{F5EE77D2-A7A0-440A-9FFE-8D75038282A9}" type="datetimeFigureOut">
               <a:rPr lang="en-GB" smtClean="0"/>
-              <a:t>12/12/2020</a:t>
+              <a:t>14/12/2020</a:t>
             </a:fld>
             <a:endParaRPr lang="en-GB"/>
           </a:p>
@@ -5980,7 +5980,7 @@
           <a:p>
             <a:fld id="{F5EE77D2-A7A0-440A-9FFE-8D75038282A9}" type="datetimeFigureOut">
               <a:rPr lang="en-GB" smtClean="0"/>
-              <a:t>12/12/2020</a:t>
+              <a:t>14/12/2020</a:t>
             </a:fld>
             <a:endParaRPr lang="en-GB"/>
           </a:p>
@@ -6098,7 +6098,7 @@
           <a:p>
             <a:fld id="{F5EE77D2-A7A0-440A-9FFE-8D75038282A9}" type="datetimeFigureOut">
               <a:rPr lang="en-GB" smtClean="0"/>
-              <a:t>12/12/2020</a:t>
+              <a:t>14/12/2020</a:t>
             </a:fld>
             <a:endParaRPr lang="en-GB"/>
           </a:p>
@@ -6193,7 +6193,7 @@
           <a:p>
             <a:fld id="{F5EE77D2-A7A0-440A-9FFE-8D75038282A9}" type="datetimeFigureOut">
               <a:rPr lang="en-GB" smtClean="0"/>
-              <a:t>12/12/2020</a:t>
+              <a:t>14/12/2020</a:t>
             </a:fld>
             <a:endParaRPr lang="en-GB"/>
           </a:p>
@@ -6442,7 +6442,7 @@
           <a:p>
             <a:fld id="{F5EE77D2-A7A0-440A-9FFE-8D75038282A9}" type="datetimeFigureOut">
               <a:rPr lang="en-GB" smtClean="0"/>
-              <a:t>12/12/2020</a:t>
+              <a:t>14/12/2020</a:t>
             </a:fld>
             <a:endParaRPr lang="en-GB"/>
           </a:p>
@@ -6612,7 +6612,7 @@
           <a:p>
             <a:fld id="{F5EE77D2-A7A0-440A-9FFE-8D75038282A9}" type="datetimeFigureOut">
               <a:rPr lang="en-GB" smtClean="0"/>
-              <a:t>12/12/2020</a:t>
+              <a:t>14/12/2020</a:t>
             </a:fld>
             <a:endParaRPr lang="en-GB"/>
           </a:p>
@@ -6892,7 +6892,7 @@
           <a:p>
             <a:fld id="{F5EE77D2-A7A0-440A-9FFE-8D75038282A9}" type="datetimeFigureOut">
               <a:rPr lang="en-GB" smtClean="0"/>
-              <a:t>12/12/2020</a:t>
+              <a:t>14/12/2020</a:t>
             </a:fld>
             <a:endParaRPr lang="en-GB"/>
           </a:p>
@@ -7149,7 +7149,7 @@
           <a:p>
             <a:fld id="{F5EE77D2-A7A0-440A-9FFE-8D75038282A9}" type="datetimeFigureOut">
               <a:rPr lang="en-GB" smtClean="0"/>
-              <a:t>12/12/2020</a:t>
+              <a:t>14/12/2020</a:t>
             </a:fld>
             <a:endParaRPr lang="en-GB"/>
           </a:p>
@@ -7345,7 +7345,7 @@
           <a:p>
             <a:fld id="{F5EE77D2-A7A0-440A-9FFE-8D75038282A9}" type="datetimeFigureOut">
               <a:rPr lang="en-GB" smtClean="0"/>
-              <a:t>12/12/2020</a:t>
+              <a:t>14/12/2020</a:t>
             </a:fld>
             <a:endParaRPr lang="en-GB"/>
           </a:p>
@@ -7608,7 +7608,7 @@
           <a:p>
             <a:fld id="{F5EE77D2-A7A0-440A-9FFE-8D75038282A9}" type="datetimeFigureOut">
               <a:rPr lang="en-GB" smtClean="0"/>
-              <a:t>12/12/2020</a:t>
+              <a:t>14/12/2020</a:t>
             </a:fld>
             <a:endParaRPr lang="en-GB"/>
           </a:p>
@@ -8042,7 +8042,7 @@
           <a:p>
             <a:fld id="{F5EE77D2-A7A0-440A-9FFE-8D75038282A9}" type="datetimeFigureOut">
               <a:rPr lang="en-GB" smtClean="0"/>
-              <a:t>12/12/2020</a:t>
+              <a:t>14/12/2020</a:t>
             </a:fld>
             <a:endParaRPr lang="en-GB"/>
           </a:p>
@@ -8588,7 +8588,7 @@
           <a:p>
             <a:fld id="{F5EE77D2-A7A0-440A-9FFE-8D75038282A9}" type="datetimeFigureOut">
               <a:rPr lang="en-GB" smtClean="0"/>
-              <a:t>12/12/2020</a:t>
+              <a:t>14/12/2020</a:t>
             </a:fld>
             <a:endParaRPr lang="en-GB"/>
           </a:p>
@@ -9308,7 +9308,7 @@
           <a:p>
             <a:fld id="{F5EE77D2-A7A0-440A-9FFE-8D75038282A9}" type="datetimeFigureOut">
               <a:rPr lang="en-GB" smtClean="0"/>
-              <a:t>12/12/2020</a:t>
+              <a:t>14/12/2020</a:t>
             </a:fld>
             <a:endParaRPr lang="en-GB"/>
           </a:p>
@@ -9478,7 +9478,7 @@
           <a:p>
             <a:fld id="{F5EE77D2-A7A0-440A-9FFE-8D75038282A9}" type="datetimeFigureOut">
               <a:rPr lang="en-GB" smtClean="0"/>
-              <a:t>12/12/2020</a:t>
+              <a:t>14/12/2020</a:t>
             </a:fld>
             <a:endParaRPr lang="en-GB"/>
           </a:p>
@@ -9658,7 +9658,7 @@
           <a:p>
             <a:fld id="{F5EE77D2-A7A0-440A-9FFE-8D75038282A9}" type="datetimeFigureOut">
               <a:rPr lang="en-GB" smtClean="0"/>
-              <a:t>12/12/2020</a:t>
+              <a:t>14/12/2020</a:t>
             </a:fld>
             <a:endParaRPr lang="en-GB"/>
           </a:p>
@@ -9904,7 +9904,7 @@
           <a:p>
             <a:fld id="{F5EE77D2-A7A0-440A-9FFE-8D75038282A9}" type="datetimeFigureOut">
               <a:rPr lang="en-GB" smtClean="0"/>
-              <a:t>12/12/2020</a:t>
+              <a:t>14/12/2020</a:t>
             </a:fld>
             <a:endParaRPr lang="en-GB"/>
           </a:p>
@@ -10136,7 +10136,7 @@
           <a:p>
             <a:fld id="{F5EE77D2-A7A0-440A-9FFE-8D75038282A9}" type="datetimeFigureOut">
               <a:rPr lang="en-GB" smtClean="0"/>
-              <a:t>12/12/2020</a:t>
+              <a:t>14/12/2020</a:t>
             </a:fld>
             <a:endParaRPr lang="en-GB"/>
           </a:p>
@@ -10503,7 +10503,7 @@
           <a:p>
             <a:fld id="{F5EE77D2-A7A0-440A-9FFE-8D75038282A9}" type="datetimeFigureOut">
               <a:rPr lang="en-GB" smtClean="0"/>
-              <a:t>12/12/2020</a:t>
+              <a:t>14/12/2020</a:t>
             </a:fld>
             <a:endParaRPr lang="en-GB"/>
           </a:p>
@@ -10621,7 +10621,7 @@
           <a:p>
             <a:fld id="{F5EE77D2-A7A0-440A-9FFE-8D75038282A9}" type="datetimeFigureOut">
               <a:rPr lang="en-GB" smtClean="0"/>
-              <a:t>12/12/2020</a:t>
+              <a:t>14/12/2020</a:t>
             </a:fld>
             <a:endParaRPr lang="en-GB"/>
           </a:p>
@@ -10716,7 +10716,7 @@
           <a:p>
             <a:fld id="{F5EE77D2-A7A0-440A-9FFE-8D75038282A9}" type="datetimeFigureOut">
               <a:rPr lang="en-GB" smtClean="0"/>
-              <a:t>12/12/2020</a:t>
+              <a:t>14/12/2020</a:t>
             </a:fld>
             <a:endParaRPr lang="en-GB"/>
           </a:p>
@@ -10993,7 +10993,7 @@
           <a:p>
             <a:fld id="{F5EE77D2-A7A0-440A-9FFE-8D75038282A9}" type="datetimeFigureOut">
               <a:rPr lang="en-GB" smtClean="0"/>
-              <a:t>12/12/2020</a:t>
+              <a:t>14/12/2020</a:t>
             </a:fld>
             <a:endParaRPr lang="en-GB"/>
           </a:p>
@@ -11246,7 +11246,7 @@
           <a:p>
             <a:fld id="{F5EE77D2-A7A0-440A-9FFE-8D75038282A9}" type="datetimeFigureOut">
               <a:rPr lang="en-GB" smtClean="0"/>
-              <a:t>12/12/2020</a:t>
+              <a:t>14/12/2020</a:t>
             </a:fld>
             <a:endParaRPr lang="en-GB"/>
           </a:p>
@@ -11459,7 +11459,7 @@
           <a:p>
             <a:fld id="{F5EE77D2-A7A0-440A-9FFE-8D75038282A9}" type="datetimeFigureOut">
               <a:rPr lang="en-GB" smtClean="0"/>
-              <a:t>12/12/2020</a:t>
+              <a:t>14/12/2020</a:t>
             </a:fld>
             <a:endParaRPr lang="en-GB"/>
           </a:p>
@@ -11902,7 +11902,7 @@
           <a:noFill/>
           <a:extLst>
             <a:ext uri="{909E8E84-426E-40dd-AFC4-6F175D3DCCD1}">
-              <a14:hiddenFill xmlns="" xmlns:a14="http://schemas.microsoft.com/office/drawing/2010/main">
+              <a14:hiddenFill xmlns:a14="http://schemas.microsoft.com/office/drawing/2010/main" xmlns="">
                 <a:solidFill>
                   <a:srgbClr val="FFFFFF"/>
                 </a:solidFill>
@@ -11976,7 +11976,7 @@
               </a:ln>
               <a:extLst>
                 <a:ext uri="{91240B29-F687-4f45-9708-019B960494DF}">
-                  <a14:hiddenLine xmlns="" xmlns:a14="http://schemas.microsoft.com/office/drawing/2010/main" w="9525">
+                  <a14:hiddenLine xmlns:a14="http://schemas.microsoft.com/office/drawing/2010/main" xmlns="" w="9525">
                     <a:solidFill>
                       <a:srgbClr val="000000"/>
                     </a:solidFill>
@@ -12066,7 +12066,7 @@
               </a:ln>
               <a:extLst>
                 <a:ext uri="{91240B29-F687-4f45-9708-019B960494DF}">
-                  <a14:hiddenLine xmlns="" xmlns:a14="http://schemas.microsoft.com/office/drawing/2010/main" w="9525">
+                  <a14:hiddenLine xmlns:a14="http://schemas.microsoft.com/office/drawing/2010/main" xmlns="" w="9525">
                     <a:solidFill>
                       <a:srgbClr val="000000"/>
                     </a:solidFill>
@@ -12156,7 +12156,7 @@
               </a:ln>
               <a:extLst>
                 <a:ext uri="{91240B29-F687-4f45-9708-019B960494DF}">
-                  <a14:hiddenLine xmlns="" xmlns:a14="http://schemas.microsoft.com/office/drawing/2010/main" w="9525">
+                  <a14:hiddenLine xmlns:a14="http://schemas.microsoft.com/office/drawing/2010/main" xmlns="" w="9525">
                     <a:solidFill>
                       <a:srgbClr val="000000"/>
                     </a:solidFill>
@@ -12218,7 +12218,7 @@
               </a:ln>
               <a:extLst>
                 <a:ext uri="{91240B29-F687-4f45-9708-019B960494DF}">
-                  <a14:hiddenLine xmlns="" xmlns:a14="http://schemas.microsoft.com/office/drawing/2010/main" w="9525">
+                  <a14:hiddenLine xmlns:a14="http://schemas.microsoft.com/office/drawing/2010/main" xmlns="" w="9525">
                     <a:solidFill>
                       <a:srgbClr val="000000"/>
                     </a:solidFill>
@@ -12308,7 +12308,7 @@
               </a:ln>
               <a:extLst>
                 <a:ext uri="{91240B29-F687-4f45-9708-019B960494DF}">
-                  <a14:hiddenLine xmlns="" xmlns:a14="http://schemas.microsoft.com/office/drawing/2010/main" w="9525">
+                  <a14:hiddenLine xmlns:a14="http://schemas.microsoft.com/office/drawing/2010/main" xmlns="" w="9525">
                     <a:solidFill>
                       <a:srgbClr val="000000"/>
                     </a:solidFill>
@@ -12370,7 +12370,7 @@
               </a:ln>
               <a:extLst>
                 <a:ext uri="{91240B29-F687-4f45-9708-019B960494DF}">
-                  <a14:hiddenLine xmlns="" xmlns:a14="http://schemas.microsoft.com/office/drawing/2010/main" w="9525">
+                  <a14:hiddenLine xmlns:a14="http://schemas.microsoft.com/office/drawing/2010/main" xmlns="" w="9525">
                     <a:solidFill>
                       <a:srgbClr val="000000"/>
                     </a:solidFill>
@@ -12432,7 +12432,7 @@
               </a:ln>
               <a:extLst>
                 <a:ext uri="{91240B29-F687-4f45-9708-019B960494DF}">
-                  <a14:hiddenLine xmlns="" xmlns:a14="http://schemas.microsoft.com/office/drawing/2010/main" w="9525">
+                  <a14:hiddenLine xmlns:a14="http://schemas.microsoft.com/office/drawing/2010/main" xmlns="" w="9525">
                     <a:solidFill>
                       <a:srgbClr val="000000"/>
                     </a:solidFill>
@@ -12522,7 +12522,7 @@
               </a:ln>
               <a:extLst>
                 <a:ext uri="{91240B29-F687-4f45-9708-019B960494DF}">
-                  <a14:hiddenLine xmlns="" xmlns:a14="http://schemas.microsoft.com/office/drawing/2010/main" w="9525">
+                  <a14:hiddenLine xmlns:a14="http://schemas.microsoft.com/office/drawing/2010/main" xmlns="" w="9525">
                     <a:solidFill>
                       <a:srgbClr val="000000"/>
                     </a:solidFill>
@@ -12612,7 +12612,7 @@
               </a:ln>
               <a:extLst>
                 <a:ext uri="{91240B29-F687-4f45-9708-019B960494DF}">
-                  <a14:hiddenLine xmlns="" xmlns:a14="http://schemas.microsoft.com/office/drawing/2010/main" w="9525">
+                  <a14:hiddenLine xmlns:a14="http://schemas.microsoft.com/office/drawing/2010/main" xmlns="" w="9525">
                     <a:solidFill>
                       <a:srgbClr val="000000"/>
                     </a:solidFill>
@@ -12674,7 +12674,7 @@
               </a:ln>
               <a:extLst>
                 <a:ext uri="{91240B29-F687-4f45-9708-019B960494DF}">
-                  <a14:hiddenLine xmlns="" xmlns:a14="http://schemas.microsoft.com/office/drawing/2010/main" w="9525">
+                  <a14:hiddenLine xmlns:a14="http://schemas.microsoft.com/office/drawing/2010/main" xmlns="" w="9525">
                     <a:solidFill>
                       <a:srgbClr val="000000"/>
                     </a:solidFill>
@@ -12784,7 +12784,7 @@
               </a:ln>
               <a:extLst>
                 <a:ext uri="{91240B29-F687-4f45-9708-019B960494DF}">
-                  <a14:hiddenLine xmlns="" xmlns:a14="http://schemas.microsoft.com/office/drawing/2010/main" w="9525">
+                  <a14:hiddenLine xmlns:a14="http://schemas.microsoft.com/office/drawing/2010/main" xmlns="" w="9525">
                     <a:solidFill>
                       <a:srgbClr val="000000"/>
                     </a:solidFill>
@@ -12868,7 +12868,7 @@
               </a:ln>
               <a:extLst>
                 <a:ext uri="{91240B29-F687-4f45-9708-019B960494DF}">
-                  <a14:hiddenLine xmlns="" xmlns:a14="http://schemas.microsoft.com/office/drawing/2010/main" w="9525">
+                  <a14:hiddenLine xmlns:a14="http://schemas.microsoft.com/office/drawing/2010/main" xmlns="" w="9525">
                     <a:solidFill>
                       <a:srgbClr val="000000"/>
                     </a:solidFill>
@@ -12930,7 +12930,7 @@
               </a:ln>
               <a:extLst>
                 <a:ext uri="{91240B29-F687-4f45-9708-019B960494DF}">
-                  <a14:hiddenLine xmlns="" xmlns:a14="http://schemas.microsoft.com/office/drawing/2010/main" w="9525">
+                  <a14:hiddenLine xmlns:a14="http://schemas.microsoft.com/office/drawing/2010/main" xmlns="" w="9525">
                     <a:solidFill>
                       <a:srgbClr val="000000"/>
                     </a:solidFill>
@@ -12992,7 +12992,7 @@
               </a:ln>
               <a:extLst>
                 <a:ext uri="{91240B29-F687-4f45-9708-019B960494DF}">
-                  <a14:hiddenLine xmlns="" xmlns:a14="http://schemas.microsoft.com/office/drawing/2010/main" w="9525">
+                  <a14:hiddenLine xmlns:a14="http://schemas.microsoft.com/office/drawing/2010/main" xmlns="" w="9525">
                     <a:solidFill>
                       <a:srgbClr val="000000"/>
                     </a:solidFill>
@@ -13082,7 +13082,7 @@
               </a:ln>
               <a:extLst>
                 <a:ext uri="{91240B29-F687-4f45-9708-019B960494DF}">
-                  <a14:hiddenLine xmlns="" xmlns:a14="http://schemas.microsoft.com/office/drawing/2010/main" w="9525">
+                  <a14:hiddenLine xmlns:a14="http://schemas.microsoft.com/office/drawing/2010/main" xmlns="" w="9525">
                     <a:solidFill>
                       <a:srgbClr val="000000"/>
                     </a:solidFill>
@@ -13116,7 +13116,7 @@
               </a:ln>
               <a:extLst>
                 <a:ext uri="{91240B29-F687-4f45-9708-019B960494DF}">
-                  <a14:hiddenLine xmlns="" xmlns:a14="http://schemas.microsoft.com/office/drawing/2010/main" w="9525">
+                  <a14:hiddenLine xmlns:a14="http://schemas.microsoft.com/office/drawing/2010/main" xmlns="" w="9525">
                     <a:solidFill>
                       <a:srgbClr val="000000"/>
                     </a:solidFill>
@@ -13181,7 +13181,7 @@
               </a:ln>
               <a:extLst>
                 <a:ext uri="{91240B29-F687-4f45-9708-019B960494DF}">
-                  <a14:hiddenLine xmlns="" xmlns:a14="http://schemas.microsoft.com/office/drawing/2010/main" w="9525">
+                  <a14:hiddenLine xmlns:a14="http://schemas.microsoft.com/office/drawing/2010/main" xmlns="" w="9525">
                     <a:solidFill>
                       <a:srgbClr val="000000"/>
                     </a:solidFill>
@@ -13271,7 +13271,7 @@
               </a:ln>
               <a:extLst>
                 <a:ext uri="{91240B29-F687-4f45-9708-019B960494DF}">
-                  <a14:hiddenLine xmlns="" xmlns:a14="http://schemas.microsoft.com/office/drawing/2010/main" w="9525">
+                  <a14:hiddenLine xmlns:a14="http://schemas.microsoft.com/office/drawing/2010/main" xmlns="" w="9525">
                     <a:solidFill>
                       <a:srgbClr val="000000"/>
                     </a:solidFill>
@@ -13333,7 +13333,7 @@
               </a:ln>
               <a:extLst>
                 <a:ext uri="{91240B29-F687-4f45-9708-019B960494DF}">
-                  <a14:hiddenLine xmlns="" xmlns:a14="http://schemas.microsoft.com/office/drawing/2010/main" w="9525">
+                  <a14:hiddenLine xmlns:a14="http://schemas.microsoft.com/office/drawing/2010/main" xmlns="" w="9525">
                     <a:solidFill>
                       <a:srgbClr val="000000"/>
                     </a:solidFill>
@@ -13423,7 +13423,7 @@
               </a:ln>
               <a:extLst>
                 <a:ext uri="{91240B29-F687-4f45-9708-019B960494DF}">
-                  <a14:hiddenLine xmlns="" xmlns:a14="http://schemas.microsoft.com/office/drawing/2010/main" w="9525">
+                  <a14:hiddenLine xmlns:a14="http://schemas.microsoft.com/office/drawing/2010/main" xmlns="" w="9525">
                     <a:solidFill>
                       <a:srgbClr val="000000"/>
                     </a:solidFill>
@@ -13488,7 +13488,7 @@
               </a:ln>
               <a:extLst>
                 <a:ext uri="{91240B29-F687-4f45-9708-019B960494DF}">
-                  <a14:hiddenLine xmlns="" xmlns:a14="http://schemas.microsoft.com/office/drawing/2010/main" w="9525">
+                  <a14:hiddenLine xmlns:a14="http://schemas.microsoft.com/office/drawing/2010/main" xmlns="" w="9525">
                     <a:solidFill>
                       <a:srgbClr val="000000"/>
                     </a:solidFill>
@@ -13550,7 +13550,7 @@
               </a:ln>
               <a:extLst>
                 <a:ext uri="{91240B29-F687-4f45-9708-019B960494DF}">
-                  <a14:hiddenLine xmlns="" xmlns:a14="http://schemas.microsoft.com/office/drawing/2010/main" w="9525">
+                  <a14:hiddenLine xmlns:a14="http://schemas.microsoft.com/office/drawing/2010/main" xmlns="" w="9525">
                     <a:solidFill>
                       <a:srgbClr val="000000"/>
                     </a:solidFill>
@@ -13640,7 +13640,7 @@
               </a:ln>
               <a:extLst>
                 <a:ext uri="{91240B29-F687-4f45-9708-019B960494DF}">
-                  <a14:hiddenLine xmlns="" xmlns:a14="http://schemas.microsoft.com/office/drawing/2010/main" w="9525">
+                  <a14:hiddenLine xmlns:a14="http://schemas.microsoft.com/office/drawing/2010/main" xmlns="" w="9525">
                     <a:solidFill>
                       <a:srgbClr val="000000"/>
                     </a:solidFill>
@@ -13730,7 +13730,7 @@
               </a:ln>
               <a:extLst>
                 <a:ext uri="{91240B29-F687-4f45-9708-019B960494DF}">
-                  <a14:hiddenLine xmlns="" xmlns:a14="http://schemas.microsoft.com/office/drawing/2010/main" w="9525">
+                  <a14:hiddenLine xmlns:a14="http://schemas.microsoft.com/office/drawing/2010/main" xmlns="" w="9525">
                     <a:solidFill>
                       <a:srgbClr val="000000"/>
                     </a:solidFill>
@@ -13795,7 +13795,7 @@
               </a:ln>
               <a:extLst>
                 <a:ext uri="{91240B29-F687-4f45-9708-019B960494DF}">
-                  <a14:hiddenLine xmlns="" xmlns:a14="http://schemas.microsoft.com/office/drawing/2010/main" w="9525">
+                  <a14:hiddenLine xmlns:a14="http://schemas.microsoft.com/office/drawing/2010/main" xmlns="" w="9525">
                     <a:solidFill>
                       <a:srgbClr val="000000"/>
                     </a:solidFill>
@@ -13915,7 +13915,7 @@
               </a:ln>
               <a:extLst>
                 <a:ext uri="{91240B29-F687-4f45-9708-019B960494DF}">
-                  <a14:hiddenLine xmlns="" xmlns:a14="http://schemas.microsoft.com/office/drawing/2010/main" w="9525">
+                  <a14:hiddenLine xmlns:a14="http://schemas.microsoft.com/office/drawing/2010/main" xmlns="" w="9525">
                     <a:solidFill>
                       <a:srgbClr val="000000"/>
                     </a:solidFill>
@@ -14013,7 +14013,7 @@
               </a:ln>
               <a:extLst>
                 <a:ext uri="{91240B29-F687-4f45-9708-019B960494DF}">
-                  <a14:hiddenLine xmlns="" xmlns:a14="http://schemas.microsoft.com/office/drawing/2010/main" w="9525">
+                  <a14:hiddenLine xmlns:a14="http://schemas.microsoft.com/office/drawing/2010/main" xmlns="" w="9525">
                     <a:solidFill>
                       <a:srgbClr val="000000"/>
                     </a:solidFill>
@@ -14128,7 +14128,7 @@
               </a:ln>
               <a:extLst>
                 <a:ext uri="{91240B29-F687-4f45-9708-019B960494DF}">
-                  <a14:hiddenLine xmlns="" xmlns:a14="http://schemas.microsoft.com/office/drawing/2010/main" w="9525">
+                  <a14:hiddenLine xmlns:a14="http://schemas.microsoft.com/office/drawing/2010/main" xmlns="" w="9525">
                     <a:solidFill>
                       <a:srgbClr val="000000"/>
                     </a:solidFill>
@@ -14218,7 +14218,7 @@
               </a:ln>
               <a:extLst>
                 <a:ext uri="{91240B29-F687-4f45-9708-019B960494DF}">
-                  <a14:hiddenLine xmlns="" xmlns:a14="http://schemas.microsoft.com/office/drawing/2010/main" w="9525">
+                  <a14:hiddenLine xmlns:a14="http://schemas.microsoft.com/office/drawing/2010/main" xmlns="" w="9525">
                     <a:solidFill>
                       <a:srgbClr val="000000"/>
                     </a:solidFill>
@@ -14283,7 +14283,7 @@
               </a:ln>
               <a:extLst>
                 <a:ext uri="{91240B29-F687-4f45-9708-019B960494DF}">
-                  <a14:hiddenLine xmlns="" xmlns:a14="http://schemas.microsoft.com/office/drawing/2010/main" w="9525">
+                  <a14:hiddenLine xmlns:a14="http://schemas.microsoft.com/office/drawing/2010/main" xmlns="" w="9525">
                     <a:solidFill>
                       <a:srgbClr val="000000"/>
                     </a:solidFill>
@@ -14373,7 +14373,7 @@
               </a:ln>
               <a:extLst>
                 <a:ext uri="{91240B29-F687-4f45-9708-019B960494DF}">
-                  <a14:hiddenLine xmlns="" xmlns:a14="http://schemas.microsoft.com/office/drawing/2010/main" w="9525">
+                  <a14:hiddenLine xmlns:a14="http://schemas.microsoft.com/office/drawing/2010/main" xmlns="" w="9525">
                     <a:solidFill>
                       <a:srgbClr val="000000"/>
                     </a:solidFill>
@@ -14441,7 +14441,7 @@
               </a:ln>
               <a:extLst>
                 <a:ext uri="{91240B29-F687-4f45-9708-019B960494DF}">
-                  <a14:hiddenLine xmlns="" xmlns:a14="http://schemas.microsoft.com/office/drawing/2010/main" w="9525">
+                  <a14:hiddenLine xmlns:a14="http://schemas.microsoft.com/office/drawing/2010/main" xmlns="" w="9525">
                     <a:solidFill>
                       <a:srgbClr val="000000"/>
                     </a:solidFill>
@@ -14531,7 +14531,7 @@
               </a:ln>
               <a:extLst>
                 <a:ext uri="{91240B29-F687-4f45-9708-019B960494DF}">
-                  <a14:hiddenLine xmlns="" xmlns:a14="http://schemas.microsoft.com/office/drawing/2010/main" w="9525">
+                  <a14:hiddenLine xmlns:a14="http://schemas.microsoft.com/office/drawing/2010/main" xmlns="" w="9525">
                     <a:solidFill>
                       <a:srgbClr val="000000"/>
                     </a:solidFill>
@@ -14599,7 +14599,7 @@
               </a:ln>
               <a:extLst>
                 <a:ext uri="{91240B29-F687-4f45-9708-019B960494DF}">
-                  <a14:hiddenLine xmlns="" xmlns:a14="http://schemas.microsoft.com/office/drawing/2010/main" w="9525">
+                  <a14:hiddenLine xmlns:a14="http://schemas.microsoft.com/office/drawing/2010/main" xmlns="" w="9525">
                     <a:solidFill>
                       <a:srgbClr val="000000"/>
                     </a:solidFill>
@@ -14689,7 +14689,7 @@
               </a:ln>
               <a:extLst>
                 <a:ext uri="{91240B29-F687-4f45-9708-019B960494DF}">
-                  <a14:hiddenLine xmlns="" xmlns:a14="http://schemas.microsoft.com/office/drawing/2010/main" w="9525">
+                  <a14:hiddenLine xmlns:a14="http://schemas.microsoft.com/office/drawing/2010/main" xmlns="" w="9525">
                     <a:solidFill>
                       <a:srgbClr val="000000"/>
                     </a:solidFill>
@@ -14723,7 +14723,7 @@
               </a:ln>
               <a:extLst>
                 <a:ext uri="{91240B29-F687-4f45-9708-019B960494DF}">
-                  <a14:hiddenLine xmlns="" xmlns:a14="http://schemas.microsoft.com/office/drawing/2010/main" w="9525">
+                  <a14:hiddenLine xmlns:a14="http://schemas.microsoft.com/office/drawing/2010/main" xmlns="" w="9525">
                     <a:solidFill>
                       <a:srgbClr val="000000"/>
                     </a:solidFill>
@@ -14863,7 +14863,7 @@
           <a:p>
             <a:fld id="{F5EE77D2-A7A0-440A-9FFE-8D75038282A9}" type="datetimeFigureOut">
               <a:rPr lang="en-GB" smtClean="0"/>
-              <a:t>12/12/2020</a:t>
+              <a:t>14/12/2020</a:t>
             </a:fld>
             <a:endParaRPr lang="en-GB"/>
           </a:p>
@@ -15367,7 +15367,7 @@
               <a:t>RARA| NALDI |</a:t>
             </a:r>
             <a:r>
-              <a:rPr lang="en-ID" sz="4000" dirty="0" err="1">
+              <a:rPr lang="en-ID" sz="4000" dirty="0" err="1" smtClean="0">
                 <a:solidFill>
                   <a:schemeClr val="tx2">
                     <a:lumMod val="60000"/>
@@ -15375,7 +15375,7 @@
                   </a:schemeClr>
                 </a:solidFill>
               </a:rPr>
-              <a:t>rIZAL|iwin</a:t>
+              <a:t>rIZAl</a:t>
             </a:r>
             <a:endParaRPr lang="en-GB" sz="4000" dirty="0">
               <a:solidFill>
@@ -15473,8 +15473,8 @@
         </p:nvSpPr>
         <p:spPr>
           <a:xfrm>
-            <a:off x="1524415" y="1667517"/>
-            <a:ext cx="900000" cy="288000"/>
+            <a:off x="1524414" y="1667517"/>
+            <a:ext cx="952877" cy="288000"/>
           </a:xfrm>
           <a:prstGeom prst="rect">
             <a:avLst/>
@@ -15500,8 +15500,16 @@
           <a:p>
             <a:pPr algn="ctr"/>
             <a:r>
+              <a:rPr lang="en-ID" sz="1400" dirty="0" err="1" smtClean="0"/>
+              <a:t>Dibawah</a:t>
+            </a:r>
+            <a:r>
+              <a:rPr lang="en-ID" sz="1400" dirty="0" smtClean="0"/>
+              <a:t> </a:t>
+            </a:r>
+            <a:r>
               <a:rPr lang="en-ID" sz="1400" dirty="0"/>
-              <a:t>&lt; 4</a:t>
+              <a:t>4</a:t>
             </a:r>
             <a:endParaRPr lang="en-GB" sz="1400" dirty="0"/>
           </a:p>
@@ -15515,7 +15523,7 @@
         </p:nvSpPr>
         <p:spPr>
           <a:xfrm>
-            <a:off x="1524415" y="3678889"/>
+            <a:off x="1550852" y="3678889"/>
             <a:ext cx="900000" cy="288000"/>
           </a:xfrm>
           <a:prstGeom prst="rect">
@@ -15557,7 +15565,7 @@
         </p:nvSpPr>
         <p:spPr>
           <a:xfrm>
-            <a:off x="1524414" y="5690260"/>
+            <a:off x="1550852" y="5690260"/>
             <a:ext cx="900000" cy="288000"/>
           </a:xfrm>
           <a:prstGeom prst="rect">
@@ -15584,8 +15592,12 @@
           <a:p>
             <a:pPr algn="ctr"/>
             <a:r>
-              <a:rPr lang="en-ID" sz="1400" dirty="0"/>
-              <a:t>10&lt;</a:t>
+              <a:rPr lang="en-ID" sz="1400" dirty="0" err="1" smtClean="0"/>
+              <a:t>Diatas</a:t>
+            </a:r>
+            <a:r>
+              <a:rPr lang="en-ID" sz="1400" dirty="0" smtClean="0"/>
+              <a:t> 10</a:t>
             </a:r>
             <a:endParaRPr lang="en-GB" sz="1400" dirty="0"/>
           </a:p>
@@ -16485,7 +16497,7 @@
         <p:spPr>
           <a:xfrm flipV="1">
             <a:off x="1061737" y="1811517"/>
-            <a:ext cx="462678" cy="1981043"/>
+            <a:ext cx="462677" cy="1981043"/>
           </a:xfrm>
           <a:prstGeom prst="straightConnector1">
             <a:avLst/>
@@ -16521,7 +16533,7 @@
         <p:spPr>
           <a:xfrm>
             <a:off x="1061737" y="3792560"/>
-            <a:ext cx="462678" cy="30329"/>
+            <a:ext cx="489115" cy="30329"/>
           </a:xfrm>
           <a:prstGeom prst="straightConnector1">
             <a:avLst/>
@@ -16557,7 +16569,7 @@
         <p:spPr>
           <a:xfrm>
             <a:off x="1061737" y="3792560"/>
-            <a:ext cx="462677" cy="2041700"/>
+            <a:ext cx="489115" cy="2041700"/>
           </a:xfrm>
           <a:prstGeom prst="straightConnector1">
             <a:avLst/>
@@ -16592,8 +16604,8 @@
         </p:nvCxnSpPr>
         <p:spPr>
           <a:xfrm flipV="1">
-            <a:off x="2424415" y="1402837"/>
-            <a:ext cx="532101" cy="408680"/>
+            <a:off x="2477291" y="1402837"/>
+            <a:ext cx="479225" cy="408680"/>
           </a:xfrm>
           <a:prstGeom prst="straightConnector1">
             <a:avLst/>
@@ -16628,8 +16640,8 @@
         </p:nvCxnSpPr>
         <p:spPr>
           <a:xfrm>
-            <a:off x="2424415" y="1811517"/>
-            <a:ext cx="532101" cy="535471"/>
+            <a:off x="2477291" y="1811517"/>
+            <a:ext cx="479225" cy="535471"/>
           </a:xfrm>
           <a:prstGeom prst="straightConnector1">
             <a:avLst/>
@@ -16664,8 +16676,8 @@
         </p:nvCxnSpPr>
         <p:spPr>
           <a:xfrm flipV="1">
-            <a:off x="2424415" y="3290751"/>
-            <a:ext cx="532101" cy="532138"/>
+            <a:off x="2450852" y="3290751"/>
+            <a:ext cx="505664" cy="532138"/>
           </a:xfrm>
           <a:prstGeom prst="straightConnector1">
             <a:avLst/>
@@ -16700,8 +16712,8 @@
         </p:nvCxnSpPr>
         <p:spPr>
           <a:xfrm>
-            <a:off x="2424415" y="3822889"/>
-            <a:ext cx="532101" cy="411819"/>
+            <a:off x="2450852" y="3822889"/>
+            <a:ext cx="505664" cy="411819"/>
           </a:xfrm>
           <a:prstGeom prst="straightConnector1">
             <a:avLst/>
@@ -16736,8 +16748,8 @@
         </p:nvCxnSpPr>
         <p:spPr>
           <a:xfrm flipV="1">
-            <a:off x="2424414" y="5178665"/>
-            <a:ext cx="532102" cy="655595"/>
+            <a:off x="2450852" y="5178665"/>
+            <a:ext cx="505664" cy="655595"/>
           </a:xfrm>
           <a:prstGeom prst="straightConnector1">
             <a:avLst/>
@@ -16772,8 +16784,8 @@
         </p:nvCxnSpPr>
         <p:spPr>
           <a:xfrm>
-            <a:off x="2424414" y="5834260"/>
-            <a:ext cx="532102" cy="288364"/>
+            <a:off x="2450852" y="5834260"/>
+            <a:ext cx="505664" cy="288364"/>
           </a:xfrm>
           <a:prstGeom prst="straightConnector1">
             <a:avLst/>
@@ -21722,111 +21734,6 @@
                 </a:outerShdw>
               </a:effectLst>
             </a:endParaRPr>
-          </a:p>
-        </p:txBody>
-      </p:sp>
-      <p:sp>
-        <p:nvSpPr>
-          <p:cNvPr id="137" name="Rectangle 136"/>
-          <p:cNvSpPr/>
-          <p:nvPr/>
-        </p:nvSpPr>
-        <p:spPr>
-          <a:xfrm>
-            <a:off x="116875" y="748996"/>
-            <a:ext cx="1350613" cy="288000"/>
-          </a:xfrm>
-          <a:prstGeom prst="rect">
-            <a:avLst/>
-          </a:prstGeom>
-          <a:ln>
-            <a:noFill/>
-          </a:ln>
-        </p:spPr>
-        <p:style>
-          <a:lnRef idx="2">
-            <a:schemeClr val="dk1"/>
-          </a:lnRef>
-          <a:fillRef idx="1">
-            <a:schemeClr val="lt1"/>
-          </a:fillRef>
-          <a:effectRef idx="0">
-            <a:schemeClr val="dk1"/>
-          </a:effectRef>
-          <a:fontRef idx="minor">
-            <a:schemeClr val="dk1"/>
-          </a:fontRef>
-        </p:style>
-        <p:txBody>
-          <a:bodyPr rtlCol="0" anchor="ctr"/>
-          <a:lstStyle/>
-          <a:p>
-            <a:pPr algn="ctr"/>
-            <a:r>
-              <a:rPr lang="en-ID" sz="1400" dirty="0"/>
-              <a:t>*</a:t>
-            </a:r>
-            <a:r>
-              <a:rPr lang="en-ID" sz="1400" dirty="0" err="1"/>
-              <a:t>tombol</a:t>
-            </a:r>
-            <a:r>
-              <a:rPr lang="en-ID" sz="1400" dirty="0"/>
-              <a:t> 1 2 3 </a:t>
-            </a:r>
-            <a:r>
-              <a:rPr lang="en-ID" sz="1400" dirty="0" err="1"/>
-              <a:t>buat</a:t>
-            </a:r>
-            <a:r>
-              <a:rPr lang="en-ID" sz="1400" dirty="0"/>
-              <a:t> hyperlink </a:t>
-            </a:r>
-            <a:r>
-              <a:rPr lang="en-ID" sz="1400" dirty="0" err="1"/>
-              <a:t>ke</a:t>
-            </a:r>
-            <a:r>
-              <a:rPr lang="en-ID" sz="1400" dirty="0"/>
-              <a:t> </a:t>
-            </a:r>
-            <a:r>
-              <a:rPr lang="en-ID" sz="1400" dirty="0" err="1"/>
-              <a:t>gambar</a:t>
-            </a:r>
-            <a:r>
-              <a:rPr lang="en-ID" sz="1400" dirty="0"/>
-              <a:t> laptop yang </a:t>
-            </a:r>
-            <a:r>
-              <a:rPr lang="en-ID" sz="1400" dirty="0" err="1"/>
-              <a:t>sesuai</a:t>
-            </a:r>
-            <a:r>
-              <a:rPr lang="en-ID" sz="1400" dirty="0"/>
-              <a:t> </a:t>
-            </a:r>
-            <a:r>
-              <a:rPr lang="en-ID" sz="1400" dirty="0" err="1"/>
-              <a:t>dengan</a:t>
-            </a:r>
-            <a:r>
-              <a:rPr lang="en-ID" sz="1400" dirty="0"/>
-              <a:t> </a:t>
-            </a:r>
-            <a:r>
-              <a:rPr lang="en-ID" sz="1400" dirty="0" err="1"/>
-              <a:t>spesifikasi</a:t>
-            </a:r>
-            <a:r>
-              <a:rPr lang="en-ID" sz="1400" dirty="0"/>
-              <a:t> </a:t>
-            </a:r>
-            <a:r>
-              <a:rPr lang="en-ID" sz="1400" dirty="0" err="1"/>
-              <a:t>disamping</a:t>
-            </a:r>
-            <a:endParaRPr lang="en-GB" sz="1400" dirty="0"/>
           </a:p>
         </p:txBody>
       </p:sp>
@@ -25220,111 +25127,6 @@
       </p:sp>
       <p:sp>
         <p:nvSpPr>
-          <p:cNvPr id="137" name="Rectangle 136"/>
-          <p:cNvSpPr/>
-          <p:nvPr/>
-        </p:nvSpPr>
-        <p:spPr>
-          <a:xfrm>
-            <a:off x="116875" y="748996"/>
-            <a:ext cx="1350613" cy="288000"/>
-          </a:xfrm>
-          <a:prstGeom prst="rect">
-            <a:avLst/>
-          </a:prstGeom>
-          <a:ln>
-            <a:noFill/>
-          </a:ln>
-        </p:spPr>
-        <p:style>
-          <a:lnRef idx="2">
-            <a:schemeClr val="dk1"/>
-          </a:lnRef>
-          <a:fillRef idx="1">
-            <a:schemeClr val="lt1"/>
-          </a:fillRef>
-          <a:effectRef idx="0">
-            <a:schemeClr val="dk1"/>
-          </a:effectRef>
-          <a:fontRef idx="minor">
-            <a:schemeClr val="dk1"/>
-          </a:fontRef>
-        </p:style>
-        <p:txBody>
-          <a:bodyPr rtlCol="0" anchor="ctr"/>
-          <a:lstStyle/>
-          <a:p>
-            <a:pPr algn="ctr"/>
-            <a:r>
-              <a:rPr lang="en-ID" sz="1400" dirty="0"/>
-              <a:t>*</a:t>
-            </a:r>
-            <a:r>
-              <a:rPr lang="en-ID" sz="1400" dirty="0" err="1"/>
-              <a:t>tombol</a:t>
-            </a:r>
-            <a:r>
-              <a:rPr lang="en-ID" sz="1400" dirty="0"/>
-              <a:t> 1 2 3 </a:t>
-            </a:r>
-            <a:r>
-              <a:rPr lang="en-ID" sz="1400" dirty="0" err="1"/>
-              <a:t>buat</a:t>
-            </a:r>
-            <a:r>
-              <a:rPr lang="en-ID" sz="1400" dirty="0"/>
-              <a:t> hyperlink </a:t>
-            </a:r>
-            <a:r>
-              <a:rPr lang="en-ID" sz="1400" dirty="0" err="1"/>
-              <a:t>ke</a:t>
-            </a:r>
-            <a:r>
-              <a:rPr lang="en-ID" sz="1400" dirty="0"/>
-              <a:t> </a:t>
-            </a:r>
-            <a:r>
-              <a:rPr lang="en-ID" sz="1400" dirty="0" err="1"/>
-              <a:t>gambar</a:t>
-            </a:r>
-            <a:r>
-              <a:rPr lang="en-ID" sz="1400" dirty="0"/>
-              <a:t> laptop yang </a:t>
-            </a:r>
-            <a:r>
-              <a:rPr lang="en-ID" sz="1400" dirty="0" err="1"/>
-              <a:t>sesuai</a:t>
-            </a:r>
-            <a:r>
-              <a:rPr lang="en-ID" sz="1400" dirty="0"/>
-              <a:t> </a:t>
-            </a:r>
-            <a:r>
-              <a:rPr lang="en-ID" sz="1400" dirty="0" err="1"/>
-              <a:t>dengan</a:t>
-            </a:r>
-            <a:r>
-              <a:rPr lang="en-ID" sz="1400" dirty="0"/>
-              <a:t> </a:t>
-            </a:r>
-            <a:r>
-              <a:rPr lang="en-ID" sz="1400" dirty="0" err="1"/>
-              <a:t>spesifikasi</a:t>
-            </a:r>
-            <a:r>
-              <a:rPr lang="en-ID" sz="1400" dirty="0"/>
-              <a:t> </a:t>
-            </a:r>
-            <a:r>
-              <a:rPr lang="en-ID" sz="1400" dirty="0" err="1"/>
-              <a:t>disamping</a:t>
-            </a:r>
-            <a:endParaRPr lang="en-GB" sz="1400" dirty="0"/>
-          </a:p>
-        </p:txBody>
-      </p:sp>
-      <p:sp>
-        <p:nvSpPr>
           <p:cNvPr id="138" name="Rectangle 137">
             <a:extLst>
               <a:ext uri="{FF2B5EF4-FFF2-40B4-BE49-F238E27FC236}">
@@ -30652,111 +30454,6 @@
       </p:sp>
       <p:sp>
         <p:nvSpPr>
-          <p:cNvPr id="137" name="Rectangle 136"/>
-          <p:cNvSpPr/>
-          <p:nvPr/>
-        </p:nvSpPr>
-        <p:spPr>
-          <a:xfrm>
-            <a:off x="116875" y="748996"/>
-            <a:ext cx="1350613" cy="288000"/>
-          </a:xfrm>
-          <a:prstGeom prst="rect">
-            <a:avLst/>
-          </a:prstGeom>
-          <a:ln>
-            <a:noFill/>
-          </a:ln>
-        </p:spPr>
-        <p:style>
-          <a:lnRef idx="2">
-            <a:schemeClr val="dk1"/>
-          </a:lnRef>
-          <a:fillRef idx="1">
-            <a:schemeClr val="lt1"/>
-          </a:fillRef>
-          <a:effectRef idx="0">
-            <a:schemeClr val="dk1"/>
-          </a:effectRef>
-          <a:fontRef idx="minor">
-            <a:schemeClr val="dk1"/>
-          </a:fontRef>
-        </p:style>
-        <p:txBody>
-          <a:bodyPr rtlCol="0" anchor="ctr"/>
-          <a:lstStyle/>
-          <a:p>
-            <a:pPr algn="ctr"/>
-            <a:r>
-              <a:rPr lang="en-ID" sz="1400" dirty="0"/>
-              <a:t>*</a:t>
-            </a:r>
-            <a:r>
-              <a:rPr lang="en-ID" sz="1400" dirty="0" err="1"/>
-              <a:t>tombol</a:t>
-            </a:r>
-            <a:r>
-              <a:rPr lang="en-ID" sz="1400" dirty="0"/>
-              <a:t> 1 2 3 </a:t>
-            </a:r>
-            <a:r>
-              <a:rPr lang="en-ID" sz="1400" dirty="0" err="1"/>
-              <a:t>buat</a:t>
-            </a:r>
-            <a:r>
-              <a:rPr lang="en-ID" sz="1400" dirty="0"/>
-              <a:t> hyperlink </a:t>
-            </a:r>
-            <a:r>
-              <a:rPr lang="en-ID" sz="1400" dirty="0" err="1"/>
-              <a:t>ke</a:t>
-            </a:r>
-            <a:r>
-              <a:rPr lang="en-ID" sz="1400" dirty="0"/>
-              <a:t> </a:t>
-            </a:r>
-            <a:r>
-              <a:rPr lang="en-ID" sz="1400" dirty="0" err="1"/>
-              <a:t>gambar</a:t>
-            </a:r>
-            <a:r>
-              <a:rPr lang="en-ID" sz="1400" dirty="0"/>
-              <a:t> laptop yang </a:t>
-            </a:r>
-            <a:r>
-              <a:rPr lang="en-ID" sz="1400" dirty="0" err="1"/>
-              <a:t>sesuai</a:t>
-            </a:r>
-            <a:r>
-              <a:rPr lang="en-ID" sz="1400" dirty="0"/>
-              <a:t> </a:t>
-            </a:r>
-            <a:r>
-              <a:rPr lang="en-ID" sz="1400" dirty="0" err="1"/>
-              <a:t>dengan</a:t>
-            </a:r>
-            <a:r>
-              <a:rPr lang="en-ID" sz="1400" dirty="0"/>
-              <a:t> </a:t>
-            </a:r>
-            <a:r>
-              <a:rPr lang="en-ID" sz="1400" dirty="0" err="1"/>
-              <a:t>spesifikasi</a:t>
-            </a:r>
-            <a:r>
-              <a:rPr lang="en-ID" sz="1400" dirty="0"/>
-              <a:t> </a:t>
-            </a:r>
-            <a:r>
-              <a:rPr lang="en-ID" sz="1400" dirty="0" err="1"/>
-              <a:t>disamping</a:t>
-            </a:r>
-            <a:endParaRPr lang="en-GB" sz="1400" dirty="0"/>
-          </a:p>
-        </p:txBody>
-      </p:sp>
-      <p:sp>
-        <p:nvSpPr>
           <p:cNvPr id="138" name="Rectangle 137">
             <a:extLst>
               <a:ext uri="{FF2B5EF4-FFF2-40B4-BE49-F238E27FC236}">
@@ -36079,111 +35776,6 @@
       </p:sp>
       <p:sp>
         <p:nvSpPr>
-          <p:cNvPr id="137" name="Rectangle 136"/>
-          <p:cNvSpPr/>
-          <p:nvPr/>
-        </p:nvSpPr>
-        <p:spPr>
-          <a:xfrm>
-            <a:off x="116875" y="748996"/>
-            <a:ext cx="1350613" cy="288000"/>
-          </a:xfrm>
-          <a:prstGeom prst="rect">
-            <a:avLst/>
-          </a:prstGeom>
-          <a:ln>
-            <a:noFill/>
-          </a:ln>
-        </p:spPr>
-        <p:style>
-          <a:lnRef idx="2">
-            <a:schemeClr val="dk1"/>
-          </a:lnRef>
-          <a:fillRef idx="1">
-            <a:schemeClr val="lt1"/>
-          </a:fillRef>
-          <a:effectRef idx="0">
-            <a:schemeClr val="dk1"/>
-          </a:effectRef>
-          <a:fontRef idx="minor">
-            <a:schemeClr val="dk1"/>
-          </a:fontRef>
-        </p:style>
-        <p:txBody>
-          <a:bodyPr rtlCol="0" anchor="ctr"/>
-          <a:lstStyle/>
-          <a:p>
-            <a:pPr algn="ctr"/>
-            <a:r>
-              <a:rPr lang="en-ID" sz="1400" dirty="0"/>
-              <a:t>*</a:t>
-            </a:r>
-            <a:r>
-              <a:rPr lang="en-ID" sz="1400" dirty="0" err="1"/>
-              <a:t>tombol</a:t>
-            </a:r>
-            <a:r>
-              <a:rPr lang="en-ID" sz="1400" dirty="0"/>
-              <a:t> 1 2 3 </a:t>
-            </a:r>
-            <a:r>
-              <a:rPr lang="en-ID" sz="1400" dirty="0" err="1"/>
-              <a:t>buat</a:t>
-            </a:r>
-            <a:r>
-              <a:rPr lang="en-ID" sz="1400" dirty="0"/>
-              <a:t> hyperlink </a:t>
-            </a:r>
-            <a:r>
-              <a:rPr lang="en-ID" sz="1400" dirty="0" err="1"/>
-              <a:t>ke</a:t>
-            </a:r>
-            <a:r>
-              <a:rPr lang="en-ID" sz="1400" dirty="0"/>
-              <a:t> </a:t>
-            </a:r>
-            <a:r>
-              <a:rPr lang="en-ID" sz="1400" dirty="0" err="1"/>
-              <a:t>gambar</a:t>
-            </a:r>
-            <a:r>
-              <a:rPr lang="en-ID" sz="1400" dirty="0"/>
-              <a:t> laptop yang </a:t>
-            </a:r>
-            <a:r>
-              <a:rPr lang="en-ID" sz="1400" dirty="0" err="1"/>
-              <a:t>sesuai</a:t>
-            </a:r>
-            <a:r>
-              <a:rPr lang="en-ID" sz="1400" dirty="0"/>
-              <a:t> </a:t>
-            </a:r>
-            <a:r>
-              <a:rPr lang="en-ID" sz="1400" dirty="0" err="1"/>
-              <a:t>dengan</a:t>
-            </a:r>
-            <a:r>
-              <a:rPr lang="en-ID" sz="1400" dirty="0"/>
-              <a:t> </a:t>
-            </a:r>
-            <a:r>
-              <a:rPr lang="en-ID" sz="1400" dirty="0" err="1"/>
-              <a:t>spesifikasi</a:t>
-            </a:r>
-            <a:r>
-              <a:rPr lang="en-ID" sz="1400" dirty="0"/>
-              <a:t> </a:t>
-            </a:r>
-            <a:r>
-              <a:rPr lang="en-ID" sz="1400" dirty="0" err="1"/>
-              <a:t>disamping</a:t>
-            </a:r>
-            <a:endParaRPr lang="en-GB" sz="1400" dirty="0"/>
-          </a:p>
-        </p:txBody>
-      </p:sp>
-      <p:sp>
-        <p:nvSpPr>
           <p:cNvPr id="138" name="Rectangle 137">
             <a:extLst>
               <a:ext uri="{FF2B5EF4-FFF2-40B4-BE49-F238E27FC236}">
@@ -41498,111 +41090,6 @@
                 </a:outerShdw>
               </a:effectLst>
             </a:endParaRPr>
-          </a:p>
-        </p:txBody>
-      </p:sp>
-      <p:sp>
-        <p:nvSpPr>
-          <p:cNvPr id="137" name="Rectangle 136"/>
-          <p:cNvSpPr/>
-          <p:nvPr/>
-        </p:nvSpPr>
-        <p:spPr>
-          <a:xfrm>
-            <a:off x="116875" y="748996"/>
-            <a:ext cx="1350613" cy="288000"/>
-          </a:xfrm>
-          <a:prstGeom prst="rect">
-            <a:avLst/>
-          </a:prstGeom>
-          <a:ln>
-            <a:noFill/>
-          </a:ln>
-        </p:spPr>
-        <p:style>
-          <a:lnRef idx="2">
-            <a:schemeClr val="dk1"/>
-          </a:lnRef>
-          <a:fillRef idx="1">
-            <a:schemeClr val="lt1"/>
-          </a:fillRef>
-          <a:effectRef idx="0">
-            <a:schemeClr val="dk1"/>
-          </a:effectRef>
-          <a:fontRef idx="minor">
-            <a:schemeClr val="dk1"/>
-          </a:fontRef>
-        </p:style>
-        <p:txBody>
-          <a:bodyPr rtlCol="0" anchor="ctr"/>
-          <a:lstStyle/>
-          <a:p>
-            <a:pPr algn="ctr"/>
-            <a:r>
-              <a:rPr lang="en-ID" sz="1400" dirty="0"/>
-              <a:t>*</a:t>
-            </a:r>
-            <a:r>
-              <a:rPr lang="en-ID" sz="1400" dirty="0" err="1"/>
-              <a:t>tombol</a:t>
-            </a:r>
-            <a:r>
-              <a:rPr lang="en-ID" sz="1400" dirty="0"/>
-              <a:t> 1 2 3 </a:t>
-            </a:r>
-            <a:r>
-              <a:rPr lang="en-ID" sz="1400" dirty="0" err="1"/>
-              <a:t>buat</a:t>
-            </a:r>
-            <a:r>
-              <a:rPr lang="en-ID" sz="1400" dirty="0"/>
-              <a:t> hyperlink </a:t>
-            </a:r>
-            <a:r>
-              <a:rPr lang="en-ID" sz="1400" dirty="0" err="1"/>
-              <a:t>ke</a:t>
-            </a:r>
-            <a:r>
-              <a:rPr lang="en-ID" sz="1400" dirty="0"/>
-              <a:t> </a:t>
-            </a:r>
-            <a:r>
-              <a:rPr lang="en-ID" sz="1400" dirty="0" err="1"/>
-              <a:t>gambar</a:t>
-            </a:r>
-            <a:r>
-              <a:rPr lang="en-ID" sz="1400" dirty="0"/>
-              <a:t> laptop yang </a:t>
-            </a:r>
-            <a:r>
-              <a:rPr lang="en-ID" sz="1400" dirty="0" err="1"/>
-              <a:t>sesuai</a:t>
-            </a:r>
-            <a:r>
-              <a:rPr lang="en-ID" sz="1400" dirty="0"/>
-              <a:t> </a:t>
-            </a:r>
-            <a:r>
-              <a:rPr lang="en-ID" sz="1400" dirty="0" err="1"/>
-              <a:t>dengan</a:t>
-            </a:r>
-            <a:r>
-              <a:rPr lang="en-ID" sz="1400" dirty="0"/>
-              <a:t> </a:t>
-            </a:r>
-            <a:r>
-              <a:rPr lang="en-ID" sz="1400" dirty="0" err="1"/>
-              <a:t>spesifikasi</a:t>
-            </a:r>
-            <a:r>
-              <a:rPr lang="en-ID" sz="1400" dirty="0"/>
-              <a:t> </a:t>
-            </a:r>
-            <a:r>
-              <a:rPr lang="en-ID" sz="1400" dirty="0" err="1"/>
-              <a:t>disamping</a:t>
-            </a:r>
-            <a:endParaRPr lang="en-GB" sz="1400" dirty="0"/>
           </a:p>
         </p:txBody>
       </p:sp>

</xml_diff>